<commit_message>
Avance de memoria hasta el capítulo 5
Falta terminar de redactar los resúmenes de cada capítulo en el capitulo 1, en el capítulo 2 falta terminar de redactar lo que es las bibliotecas utilizadas y redactar un poco mas de los conceptos de las tecnologías. En el capitulo 3 falta terminar de redactar lo que es el proyecto. El capítulo 4 esta en proceso de revisión para dar por finalizado. En el capitulo 5 esta en revisión y falta terminar de redactar lo que es el diagrama de clases y el modelo E/R y falta todo el capítulo 6 y 7 más el resumen de la memoria
</commit_message>
<xml_diff>
--- a/Diagramas y diseños/Diagrama_de_estado.pptx
+++ b/Diagramas y diseños/Diagrama_de_estado.pptx
@@ -1323,7 +1323,7 @@
           <a:p>
             <a:fld id="{5AF88BDD-2780-4DF9-A644-65A2C2E43D26}" type="datetimeFigureOut">
               <a:rPr lang="es-CL" smtClean="0"/>
-              <a:t>16-04-2019</a:t>
+              <a:t>24-05-2019</a:t>
             </a:fld>
             <a:endParaRPr lang="es-CL"/>
           </a:p>
@@ -1561,7 +1561,7 @@
           <a:p>
             <a:fld id="{5AF88BDD-2780-4DF9-A644-65A2C2E43D26}" type="datetimeFigureOut">
               <a:rPr lang="es-CL" smtClean="0"/>
-              <a:t>16-04-2019</a:t>
+              <a:t>24-05-2019</a:t>
             </a:fld>
             <a:endParaRPr lang="es-CL"/>
           </a:p>
@@ -1741,7 +1741,7 @@
           <a:p>
             <a:fld id="{5AF88BDD-2780-4DF9-A644-65A2C2E43D26}" type="datetimeFigureOut">
               <a:rPr lang="es-CL" smtClean="0"/>
-              <a:t>16-04-2019</a:t>
+              <a:t>24-05-2019</a:t>
             </a:fld>
             <a:endParaRPr lang="es-CL"/>
           </a:p>
@@ -1911,7 +1911,7 @@
           <a:p>
             <a:fld id="{5AF88BDD-2780-4DF9-A644-65A2C2E43D26}" type="datetimeFigureOut">
               <a:rPr lang="es-CL" smtClean="0"/>
-              <a:t>16-04-2019</a:t>
+              <a:t>24-05-2019</a:t>
             </a:fld>
             <a:endParaRPr lang="es-CL"/>
           </a:p>
@@ -2187,7 +2187,7 @@
           <a:p>
             <a:fld id="{5AF88BDD-2780-4DF9-A644-65A2C2E43D26}" type="datetimeFigureOut">
               <a:rPr lang="es-CL" smtClean="0"/>
-              <a:t>16-04-2019</a:t>
+              <a:t>24-05-2019</a:t>
             </a:fld>
             <a:endParaRPr lang="es-CL"/>
           </a:p>
@@ -3388,7 +3388,7 @@
           <a:p>
             <a:fld id="{5AF88BDD-2780-4DF9-A644-65A2C2E43D26}" type="datetimeFigureOut">
               <a:rPr lang="es-CL" smtClean="0"/>
-              <a:t>16-04-2019</a:t>
+              <a:t>24-05-2019</a:t>
             </a:fld>
             <a:endParaRPr lang="es-CL"/>
           </a:p>
@@ -3778,7 +3778,7 @@
           <a:p>
             <a:fld id="{5AF88BDD-2780-4DF9-A644-65A2C2E43D26}" type="datetimeFigureOut">
               <a:rPr lang="es-CL" smtClean="0"/>
-              <a:t>16-04-2019</a:t>
+              <a:t>24-05-2019</a:t>
             </a:fld>
             <a:endParaRPr lang="es-CL"/>
           </a:p>
@@ -3901,7 +3901,7 @@
           <a:p>
             <a:fld id="{5AF88BDD-2780-4DF9-A644-65A2C2E43D26}" type="datetimeFigureOut">
               <a:rPr lang="es-CL" smtClean="0"/>
-              <a:t>16-04-2019</a:t>
+              <a:t>24-05-2019</a:t>
             </a:fld>
             <a:endParaRPr lang="es-CL"/>
           </a:p>
@@ -3996,7 +3996,7 @@
           <a:p>
             <a:fld id="{5AF88BDD-2780-4DF9-A644-65A2C2E43D26}" type="datetimeFigureOut">
               <a:rPr lang="es-CL" smtClean="0"/>
-              <a:t>16-04-2019</a:t>
+              <a:t>24-05-2019</a:t>
             </a:fld>
             <a:endParaRPr lang="es-CL"/>
           </a:p>
@@ -4759,7 +4759,7 @@
           <a:p>
             <a:fld id="{5AF88BDD-2780-4DF9-A644-65A2C2E43D26}" type="datetimeFigureOut">
               <a:rPr lang="es-CL" smtClean="0"/>
-              <a:t>16-04-2019</a:t>
+              <a:t>24-05-2019</a:t>
             </a:fld>
             <a:endParaRPr lang="es-CL"/>
           </a:p>
@@ -5599,7 +5599,7 @@
           <a:p>
             <a:fld id="{5AF88BDD-2780-4DF9-A644-65A2C2E43D26}" type="datetimeFigureOut">
               <a:rPr lang="es-CL" smtClean="0"/>
-              <a:t>16-04-2019</a:t>
+              <a:t>24-05-2019</a:t>
             </a:fld>
             <a:endParaRPr lang="es-CL"/>
           </a:p>
@@ -5826,7 +5826,7 @@
           <a:p>
             <a:fld id="{5AF88BDD-2780-4DF9-A644-65A2C2E43D26}" type="datetimeFigureOut">
               <a:rPr lang="es-CL" smtClean="0"/>
-              <a:t>16-04-2019</a:t>
+              <a:t>24-05-2019</a:t>
             </a:fld>
             <a:endParaRPr lang="es-CL"/>
           </a:p>
@@ -6839,7 +6839,7 @@
         </p:nvSpPr>
         <p:spPr>
           <a:xfrm>
-            <a:off x="965659" y="976247"/>
+            <a:off x="2791218" y="323629"/>
             <a:ext cx="6834325" cy="1247876"/>
           </a:xfrm>
           <a:prstGeom prst="rect">
@@ -6995,7 +6995,7 @@
             <a:avLst/>
           </a:prstGeom>
           <a:solidFill>
-            <a:schemeClr val="accent2">
+            <a:schemeClr val="accent1">
               <a:lumMod val="60000"/>
               <a:lumOff val="40000"/>
             </a:schemeClr>
@@ -7167,7 +7167,7 @@
             <a:avLst/>
           </a:prstGeom>
           <a:solidFill>
-            <a:schemeClr val="accent2">
+            <a:schemeClr val="accent1">
               <a:lumMod val="60000"/>
               <a:lumOff val="40000"/>
             </a:schemeClr>
@@ -7339,7 +7339,7 @@
             <a:avLst/>
           </a:prstGeom>
           <a:solidFill>
-            <a:schemeClr val="accent2">
+            <a:schemeClr val="accent1">
               <a:lumMod val="60000"/>
               <a:lumOff val="40000"/>
             </a:schemeClr>
@@ -8973,7 +8973,7 @@
         </p:nvSpPr>
         <p:spPr>
           <a:xfrm>
-            <a:off x="1221171" y="948524"/>
+            <a:off x="3046730" y="295906"/>
             <a:ext cx="437940" cy="707886"/>
           </a:xfrm>
           <a:prstGeom prst="rect">
@@ -9064,7 +9064,7 @@
         </p:nvSpPr>
         <p:spPr>
           <a:xfrm>
-            <a:off x="1083312" y="1501215"/>
+            <a:off x="2908871" y="848597"/>
             <a:ext cx="713658" cy="707886"/>
           </a:xfrm>
           <a:prstGeom prst="rect">
@@ -9155,7 +9155,7 @@
         </p:nvSpPr>
         <p:spPr>
           <a:xfrm>
-            <a:off x="2958475" y="948524"/>
+            <a:off x="4784034" y="295906"/>
             <a:ext cx="399468" cy="707886"/>
           </a:xfrm>
           <a:prstGeom prst="rect">
@@ -9246,7 +9246,7 @@
         </p:nvSpPr>
         <p:spPr>
           <a:xfrm>
-            <a:off x="2792198" y="1501215"/>
+            <a:off x="4617757" y="848597"/>
             <a:ext cx="675186" cy="707886"/>
           </a:xfrm>
           <a:prstGeom prst="rect">
@@ -9337,7 +9337,7 @@
         </p:nvSpPr>
         <p:spPr>
           <a:xfrm>
-            <a:off x="4657307" y="948524"/>
+            <a:off x="6482866" y="295906"/>
             <a:ext cx="442750" cy="707886"/>
           </a:xfrm>
           <a:prstGeom prst="rect">
@@ -9428,7 +9428,7 @@
         </p:nvSpPr>
         <p:spPr>
           <a:xfrm>
-            <a:off x="4723030" y="1501215"/>
+            <a:off x="6548589" y="848597"/>
             <a:ext cx="311304" cy="707886"/>
           </a:xfrm>
           <a:prstGeom prst="rect">
@@ -9491,7 +9491,7 @@
         </p:nvSpPr>
         <p:spPr>
           <a:xfrm>
-            <a:off x="6403564" y="948524"/>
+            <a:off x="8229123" y="295906"/>
             <a:ext cx="367408" cy="707886"/>
           </a:xfrm>
           <a:prstGeom prst="rect">
@@ -9554,7 +9554,7 @@
         </p:nvSpPr>
         <p:spPr>
           <a:xfrm>
-            <a:off x="1731836" y="1193438"/>
+            <a:off x="3557395" y="540820"/>
             <a:ext cx="742511" cy="307777"/>
           </a:xfrm>
           <a:prstGeom prst="rect">
@@ -9595,7 +9595,7 @@
         </p:nvSpPr>
         <p:spPr>
           <a:xfrm>
-            <a:off x="1731836" y="1593548"/>
+            <a:off x="3557395" y="940930"/>
             <a:ext cx="811441" cy="523220"/>
           </a:xfrm>
           <a:prstGeom prst="rect">
@@ -9648,7 +9648,7 @@
         </p:nvSpPr>
         <p:spPr>
           <a:xfrm>
-            <a:off x="3353800" y="1076965"/>
+            <a:off x="5179359" y="424347"/>
             <a:ext cx="832279" cy="523220"/>
           </a:xfrm>
           <a:prstGeom prst="rect">
@@ -9701,7 +9701,7 @@
         </p:nvSpPr>
         <p:spPr>
           <a:xfrm>
-            <a:off x="3395617" y="1737379"/>
+            <a:off x="5221176" y="1084761"/>
             <a:ext cx="910827" cy="307777"/>
           </a:xfrm>
           <a:prstGeom prst="rect">
@@ -9742,7 +9742,7 @@
         </p:nvSpPr>
         <p:spPr>
           <a:xfrm>
-            <a:off x="5100057" y="1184687"/>
+            <a:off x="6925616" y="532069"/>
             <a:ext cx="643125" cy="307777"/>
           </a:xfrm>
           <a:prstGeom prst="rect">
@@ -9783,7 +9783,7 @@
         </p:nvSpPr>
         <p:spPr>
           <a:xfrm>
-            <a:off x="5095199" y="1701269"/>
+            <a:off x="6920758" y="1048651"/>
             <a:ext cx="780983" cy="307777"/>
           </a:xfrm>
           <a:prstGeom prst="rect">
@@ -9824,7 +9824,7 @@
         </p:nvSpPr>
         <p:spPr>
           <a:xfrm>
-            <a:off x="6730737" y="1184687"/>
+            <a:off x="8556296" y="532069"/>
             <a:ext cx="891591" cy="307777"/>
           </a:xfrm>
           <a:prstGeom prst="rect">
@@ -9847,102 +9847,6 @@
                 <a:cs typeface="Arial" panose="020B0604020202020204" pitchFamily="34" charset="0"/>
               </a:rPr>
               <a:t>Rechaza</a:t>
-            </a:r>
-          </a:p>
-        </p:txBody>
-      </p:sp>
-      <p:sp>
-        <p:nvSpPr>
-          <p:cNvPr id="203" name="Rectángulo 202">
-            <a:extLst>
-              <a:ext uri="{FF2B5EF4-FFF2-40B4-BE49-F238E27FC236}">
-                <a16:creationId xmlns:a16="http://schemas.microsoft.com/office/drawing/2014/main" id="{90B29FA0-12EF-4B5A-8CEA-C4732570A6D2}"/>
-              </a:ext>
-            </a:extLst>
-          </p:cNvPr>
-          <p:cNvSpPr/>
-          <p:nvPr/>
-        </p:nvSpPr>
-        <p:spPr>
-          <a:xfrm>
-            <a:off x="7917637" y="-39678"/>
-            <a:ext cx="3943708" cy="2123658"/>
-          </a:xfrm>
-          <a:prstGeom prst="rect">
-            <a:avLst/>
-          </a:prstGeom>
-          <a:noFill/>
-        </p:spPr>
-        <p:txBody>
-          <a:bodyPr wrap="none" lIns="91440" tIns="45720" rIns="91440" bIns="45720">
-            <a:spAutoFit/>
-            <a:scene3d>
-              <a:camera prst="perspectiveHeroicExtremeLeftFacing"/>
-              <a:lightRig rig="threePt" dir="t"/>
-            </a:scene3d>
-            <a:sp3d extrusionH="57150">
-              <a:bevelT w="69850" h="69850" prst="divot"/>
-            </a:sp3d>
-          </a:bodyPr>
-          <a:lstStyle/>
-          <a:p>
-            <a:pPr algn="ctr"/>
-            <a:r>
-              <a:rPr lang="es-ES" sz="6600" b="1" dirty="0">
-                <a:ln w="12700">
-                  <a:solidFill>
-                    <a:schemeClr val="tx1">
-                      <a:lumMod val="95000"/>
-                      <a:lumOff val="5000"/>
-                    </a:schemeClr>
-                  </a:solidFill>
-                  <a:prstDash val="solid"/>
-                </a:ln>
-                <a:solidFill>
-                  <a:schemeClr val="accent1">
-                    <a:lumMod val="40000"/>
-                    <a:lumOff val="60000"/>
-                  </a:schemeClr>
-                </a:solidFill>
-                <a:effectLst>
-                  <a:outerShdw blurRad="60007" dist="200025" dir="15000000" sy="30000" kx="-1800000" algn="bl" rotWithShape="0">
-                    <a:prstClr val="black">
-                      <a:alpha val="32000"/>
-                    </a:prstClr>
-                  </a:outerShdw>
-                </a:effectLst>
-              </a:rPr>
-              <a:t>Diagrama </a:t>
-            </a:r>
-          </a:p>
-          <a:p>
-            <a:pPr algn="ctr"/>
-            <a:r>
-              <a:rPr lang="es-ES" sz="6600" b="1" dirty="0">
-                <a:ln w="12700">
-                  <a:solidFill>
-                    <a:schemeClr val="tx1">
-                      <a:lumMod val="95000"/>
-                      <a:lumOff val="5000"/>
-                    </a:schemeClr>
-                  </a:solidFill>
-                  <a:prstDash val="solid"/>
-                </a:ln>
-                <a:solidFill>
-                  <a:schemeClr val="accent1">
-                    <a:lumMod val="40000"/>
-                    <a:lumOff val="60000"/>
-                  </a:schemeClr>
-                </a:solidFill>
-                <a:effectLst>
-                  <a:outerShdw blurRad="60007" dist="200025" dir="15000000" sy="30000" kx="-1800000" algn="bl" rotWithShape="0">
-                    <a:prstClr val="black">
-                      <a:alpha val="32000"/>
-                    </a:prstClr>
-                  </a:outerShdw>
-                </a:effectLst>
-              </a:rPr>
-              <a:t>de estado</a:t>
             </a:r>
           </a:p>
         </p:txBody>

</xml_diff>